<commit_message>
Von 16:9 zu 4:3
</commit_message>
<xml_diff>
--- a/Review_Dokumentationskonzept.pptx
+++ b/Review_Dokumentationskonzept.pptx
@@ -12,19 +12,19 @@
     <p:sldId id="261" r:id="rId6"/>
     <p:sldId id="262" r:id="rId7"/>
   </p:sldIdLst>
-  <p:sldSz cx="12192000" cy="6858000"/>
+  <p:sldSz cx="9144000" cy="6858000" type="screen4x3"/>
   <p:notesSz cx="6858000" cy="9144000"/>
   <p:embeddedFontLst>
     <p:embeddedFont>
-      <p:font typeface="Century Schoolbook" panose="02040604050505020304" pitchFamily="18" charset="0"/>
-      <p:regular r:id="rId8"/>
-      <p:bold r:id="rId9"/>
-      <p:italic r:id="rId10"/>
-      <p:boldItalic r:id="rId11"/>
+      <p:font typeface="Faster One" panose="020B0604020202020204" charset="0"/>
+      <p:italic r:id="rId8"/>
     </p:embeddedFont>
     <p:embeddedFont>
-      <p:font typeface="Faster One" panose="020B0604020202020204" charset="0"/>
-      <p:italic r:id="rId12"/>
+      <p:font typeface="Century Schoolbook" panose="02040604050505020304" pitchFamily="18" charset="0"/>
+      <p:regular r:id="rId9"/>
+      <p:bold r:id="rId10"/>
+      <p:italic r:id="rId11"/>
+      <p:boldItalic r:id="rId12"/>
     </p:embeddedFont>
     <p:embeddedFont>
       <p:font typeface="Wingdings 2" panose="05020102010507070707" pitchFamily="18" charset="2"/>
@@ -128,7 +128,7 @@
   </p:defaultTextStyle>
   <p:extLst>
     <p:ext uri="{EFAFB233-063F-42B5-8137-9DF3F51BA10A}">
-      <p15:sldGuideLst xmlns:p15="http://schemas.microsoft.com/office/powerpoint/2012/main" xmlns=""/>
+      <p15:sldGuideLst xmlns="" xmlns:p15="http://schemas.microsoft.com/office/powerpoint/2012/main"/>
     </p:ext>
   </p:extLst>
 </p:presentation>
@@ -173,8 +173,8 @@
         </p:nvSpPr>
         <p:spPr>
           <a:xfrm>
-            <a:off x="1261872" y="758952"/>
-            <a:ext cx="9418320" cy="4041648"/>
+            <a:off x="946404" y="758952"/>
+            <a:ext cx="7063740" cy="4041648"/>
           </a:xfrm>
         </p:spPr>
         <p:txBody>
@@ -214,8 +214,8 @@
         </p:nvSpPr>
         <p:spPr>
           <a:xfrm>
-            <a:off x="1261872" y="4800600"/>
-            <a:ext cx="9418320" cy="1691640"/>
+            <a:off x="946404" y="4800600"/>
+            <a:ext cx="7063740" cy="1691640"/>
           </a:xfrm>
         </p:spPr>
         <p:txBody>
@@ -302,7 +302,7 @@
           <a:p>
             <a:fld id="{9E016143-E03C-4CFD-AFDC-14E5BDEA754C}" type="datetimeFigureOut">
               <a:rPr lang="en-US" dirty="0"/>
-              <a:t>4/9/2017</a:t>
+              <a:t>4/10/2017</a:t>
             </a:fld>
             <a:endParaRPr lang="en-US" dirty="0"/>
           </a:p>
@@ -380,7 +380,7 @@
         <p:spPr>
           <a:xfrm>
             <a:off x="0" y="0"/>
-            <a:ext cx="457200" cy="6858000"/>
+            <a:ext cx="342900" cy="6858000"/>
           </a:xfrm>
           <a:prstGeom prst="rect">
             <a:avLst/>
@@ -529,7 +529,7 @@
           <a:p>
             <a:fld id="{C033E54A-A8CA-48C1-9504-691B58049D29}" type="datetimeFigureOut">
               <a:rPr lang="en-US" dirty="0"/>
-              <a:t>4/9/2017</a:t>
+              <a:t>4/10/2017</a:t>
             </a:fld>
             <a:endParaRPr lang="en-US" dirty="0"/>
           </a:p>
@@ -617,8 +617,8 @@
         </p:nvSpPr>
         <p:spPr>
           <a:xfrm>
-            <a:off x="8648700" y="381000"/>
-            <a:ext cx="2476500" cy="5897562"/>
+            <a:off x="6486525" y="381000"/>
+            <a:ext cx="1857375" cy="5897562"/>
           </a:xfrm>
         </p:spPr>
         <p:txBody>
@@ -645,8 +645,8 @@
         </p:nvSpPr>
         <p:spPr>
           <a:xfrm>
-            <a:off x="762000" y="381000"/>
-            <a:ext cx="7734300" cy="5897562"/>
+            <a:off x="571500" y="381000"/>
+            <a:ext cx="5800725" cy="5897562"/>
           </a:xfrm>
         </p:spPr>
         <p:txBody>
@@ -707,7 +707,7 @@
           <a:p>
             <a:fld id="{B5F6C806-BBF7-471C-9527-881CE2266695}" type="datetimeFigureOut">
               <a:rPr lang="en-US" dirty="0"/>
-              <a:t>4/9/2017</a:t>
+              <a:t>4/10/2017</a:t>
             </a:fld>
             <a:endParaRPr lang="en-US" dirty="0"/>
           </a:p>
@@ -875,7 +875,7 @@
           <a:p>
             <a:fld id="{78C94063-DF36-4330-A365-08DA1FA5B7D6}" type="datetimeFigureOut">
               <a:rPr lang="en-US" dirty="0"/>
-              <a:t>4/9/2017</a:t>
+              <a:t>4/10/2017</a:t>
             </a:fld>
             <a:endParaRPr lang="en-US" dirty="0"/>
           </a:p>
@@ -963,8 +963,8 @@
         </p:nvSpPr>
         <p:spPr>
           <a:xfrm>
-            <a:off x="1261872" y="758952"/>
-            <a:ext cx="9418320" cy="4041648"/>
+            <a:off x="946404" y="758952"/>
+            <a:ext cx="7063740" cy="4041648"/>
           </a:xfrm>
         </p:spPr>
         <p:txBody>
@@ -1000,8 +1000,8 @@
         </p:nvSpPr>
         <p:spPr>
           <a:xfrm>
-            <a:off x="1261872" y="4800600"/>
-            <a:ext cx="9418320" cy="1691640"/>
+            <a:off x="946404" y="4800600"/>
+            <a:ext cx="7063740" cy="1691640"/>
           </a:xfrm>
         </p:spPr>
         <p:txBody>
@@ -1127,7 +1127,7 @@
           <a:p>
             <a:fld id="{908A7C6C-0F39-4D70-8E8D-FE5B9C95FA73}" type="datetimeFigureOut">
               <a:rPr lang="en-US" dirty="0"/>
-              <a:t>4/9/2017</a:t>
+              <a:t>4/10/2017</a:t>
             </a:fld>
             <a:endParaRPr lang="en-US" dirty="0"/>
           </a:p>
@@ -1184,7 +1184,7 @@
         <p:spPr>
           <a:xfrm>
             <a:off x="0" y="0"/>
-            <a:ext cx="457200" cy="6858000"/>
+            <a:ext cx="342900" cy="6858000"/>
           </a:xfrm>
           <a:prstGeom prst="rect">
             <a:avLst/>
@@ -1276,8 +1276,8 @@
         </p:nvSpPr>
         <p:spPr>
           <a:xfrm>
-            <a:off x="1261872" y="1828800"/>
-            <a:ext cx="4480560" cy="4351337"/>
+            <a:off x="946404" y="1828801"/>
+            <a:ext cx="3360420" cy="4351337"/>
           </a:xfrm>
         </p:spPr>
         <p:txBody>
@@ -1361,8 +1361,8 @@
         </p:nvSpPr>
         <p:spPr>
           <a:xfrm>
-            <a:off x="6126480" y="1828800"/>
-            <a:ext cx="4480560" cy="4351337"/>
+            <a:off x="4594860" y="1828801"/>
+            <a:ext cx="3360420" cy="4351337"/>
           </a:xfrm>
         </p:spPr>
         <p:txBody>
@@ -1451,7 +1451,7 @@
           <a:p>
             <a:fld id="{DFCFA4AC-08CC-42CE-BD01-C191750A04EC}" type="datetimeFigureOut">
               <a:rPr lang="en-US" dirty="0"/>
-              <a:t>4/9/2017</a:t>
+              <a:t>4/10/2017</a:t>
             </a:fld>
             <a:endParaRPr lang="en-US" dirty="0"/>
           </a:p>
@@ -1562,8 +1562,8 @@
         </p:nvSpPr>
         <p:spPr>
           <a:xfrm>
-            <a:off x="1261872" y="1713655"/>
-            <a:ext cx="4480560" cy="731520"/>
+            <a:off x="946404" y="1713655"/>
+            <a:ext cx="3360420" cy="731520"/>
           </a:xfrm>
         </p:spPr>
         <p:txBody>
@@ -1636,8 +1636,8 @@
         </p:nvSpPr>
         <p:spPr>
           <a:xfrm>
-            <a:off x="1261872" y="2507550"/>
-            <a:ext cx="4480560" cy="3664650"/>
+            <a:off x="946404" y="2507550"/>
+            <a:ext cx="3360420" cy="3664650"/>
           </a:xfrm>
         </p:spPr>
         <p:txBody>
@@ -1721,8 +1721,8 @@
         </p:nvSpPr>
         <p:spPr>
           <a:xfrm>
-            <a:off x="6126480" y="1713655"/>
-            <a:ext cx="4480560" cy="731520"/>
+            <a:off x="4594860" y="1713655"/>
+            <a:ext cx="3360420" cy="731520"/>
           </a:xfrm>
         </p:spPr>
         <p:txBody>
@@ -1810,8 +1810,8 @@
         </p:nvSpPr>
         <p:spPr>
           <a:xfrm>
-            <a:off x="6126480" y="2507550"/>
-            <a:ext cx="4480560" cy="3664650"/>
+            <a:off x="4594860" y="2507550"/>
+            <a:ext cx="3360420" cy="3664650"/>
           </a:xfrm>
         </p:spPr>
         <p:txBody>
@@ -1900,7 +1900,7 @@
           <a:p>
             <a:fld id="{1BA7A723-92A7-435B-B681-F25B092FEFEB}" type="datetimeFigureOut">
               <a:rPr lang="en-US" dirty="0"/>
-              <a:t>4/9/2017</a:t>
+              <a:t>4/10/2017</a:t>
             </a:fld>
             <a:endParaRPr lang="en-US" dirty="0"/>
           </a:p>
@@ -2016,7 +2016,7 @@
           <a:p>
             <a:fld id="{4F170639-886C-4FCF-9EAB-ABB5DA3F3F4A}" type="datetimeFigureOut">
               <a:rPr lang="en-US" dirty="0"/>
-              <a:t>4/9/2017</a:t>
+              <a:t>4/10/2017</a:t>
             </a:fld>
             <a:endParaRPr lang="en-US" dirty="0"/>
           </a:p>
@@ -2109,7 +2109,7 @@
           <a:p>
             <a:fld id="{22230651-31F4-45D2-98AE-A2108F41BC07}" type="datetimeFigureOut">
               <a:rPr lang="en-US" dirty="0"/>
-              <a:t>4/9/2017</a:t>
+              <a:t>4/10/2017</a:t>
             </a:fld>
             <a:endParaRPr lang="en-US" dirty="0"/>
           </a:p>
@@ -2197,8 +2197,8 @@
         </p:nvSpPr>
         <p:spPr>
           <a:xfrm>
-            <a:off x="841248" y="457200"/>
-            <a:ext cx="3200400" cy="1600197"/>
+            <a:off x="630936" y="457201"/>
+            <a:ext cx="2400300" cy="1600197"/>
           </a:xfrm>
         </p:spPr>
         <p:txBody>
@@ -2231,8 +2231,8 @@
         </p:nvSpPr>
         <p:spPr>
           <a:xfrm>
-            <a:off x="4504267" y="685800"/>
-            <a:ext cx="6079066" cy="5486400"/>
+            <a:off x="3378200" y="685800"/>
+            <a:ext cx="4559300" cy="5486400"/>
           </a:xfrm>
         </p:spPr>
         <p:txBody>
@@ -2316,8 +2316,8 @@
         </p:nvSpPr>
         <p:spPr>
           <a:xfrm>
-            <a:off x="841248" y="2099734"/>
-            <a:ext cx="3200400" cy="3810001"/>
+            <a:off x="630936" y="2099735"/>
+            <a:ext cx="2400300" cy="3810001"/>
           </a:xfrm>
         </p:spPr>
         <p:txBody>
@@ -2394,7 +2394,7 @@
           <a:p>
             <a:fld id="{6F53789A-C914-4DB1-8815-80B5EC7335C5}" type="datetimeFigureOut">
               <a:rPr lang="en-US" dirty="0"/>
-              <a:t>4/9/2017</a:t>
+              <a:t>4/10/2017</a:t>
             </a:fld>
             <a:endParaRPr lang="en-US" dirty="0"/>
           </a:p>
@@ -2479,7 +2479,7 @@
         <p:spPr>
           <a:xfrm>
             <a:off x="0" y="5105400"/>
-            <a:ext cx="11292840" cy="1752600"/>
+            <a:ext cx="8469630" cy="1752600"/>
           </a:xfrm>
           <a:prstGeom prst="rect">
             <a:avLst/>
@@ -2520,8 +2520,8 @@
         </p:nvSpPr>
         <p:spPr>
           <a:xfrm>
-            <a:off x="914400" y="5257800"/>
-            <a:ext cx="9982200" cy="914400"/>
+            <a:off x="685800" y="5257800"/>
+            <a:ext cx="7486650" cy="914400"/>
           </a:xfrm>
         </p:spPr>
         <p:txBody>
@@ -2558,8 +2558,8 @@
         </p:nvSpPr>
         <p:spPr>
           <a:xfrm>
-            <a:off x="0" y="0"/>
-            <a:ext cx="11292840" cy="5128923"/>
+            <a:off x="0" y="1"/>
+            <a:ext cx="8469630" cy="5128923"/>
           </a:xfrm>
           <a:blipFill>
             <a:blip r:embed="rId2"/>
@@ -2633,8 +2633,8 @@
         </p:nvSpPr>
         <p:spPr>
           <a:xfrm>
-            <a:off x="914400" y="6108589"/>
-            <a:ext cx="9982200" cy="597011"/>
+            <a:off x="685800" y="6108590"/>
+            <a:ext cx="7486650" cy="597011"/>
           </a:xfrm>
         </p:spPr>
         <p:txBody>
@@ -2717,7 +2717,7 @@
           <a:p>
             <a:fld id="{5E6440AA-91A0-436F-8FDB-C0F939DCAE21}" type="datetimeFigureOut">
               <a:rPr lang="en-US" dirty="0"/>
-              <a:t>4/9/2017</a:t>
+              <a:t>4/10/2017</a:t>
             </a:fld>
             <a:endParaRPr lang="en-US" dirty="0"/>
           </a:p>
@@ -2806,8 +2806,8 @@
         </p:nvSpPr>
         <p:spPr>
           <a:xfrm>
-            <a:off x="11292840" y="0"/>
-            <a:ext cx="914400" cy="6858000"/>
+            <a:off x="8469630" y="0"/>
+            <a:ext cx="685800" cy="6858000"/>
           </a:xfrm>
           <a:prstGeom prst="rect">
             <a:avLst/>
@@ -2850,8 +2850,8 @@
         </p:nvSpPr>
         <p:spPr>
           <a:xfrm>
-            <a:off x="1261872" y="365760"/>
-            <a:ext cx="9692640" cy="1325562"/>
+            <a:off x="946404" y="365760"/>
+            <a:ext cx="7269480" cy="1325562"/>
           </a:xfrm>
           <a:prstGeom prst="rect">
             <a:avLst/>
@@ -2883,8 +2883,8 @@
         </p:nvSpPr>
         <p:spPr>
           <a:xfrm>
-            <a:off x="1261872" y="1828800"/>
-            <a:ext cx="8595360" cy="4351337"/>
+            <a:off x="946404" y="1828801"/>
+            <a:ext cx="6446520" cy="4351337"/>
           </a:xfrm>
           <a:prstGeom prst="rect">
             <a:avLst/>
@@ -2945,8 +2945,8 @@
         </p:nvSpPr>
         <p:spPr>
           <a:xfrm rot="16200000">
-            <a:off x="10797542" y="998537"/>
-            <a:ext cx="1904999" cy="365125"/>
+            <a:off x="7860032" y="1044178"/>
+            <a:ext cx="1904999" cy="273844"/>
           </a:xfrm>
           <a:prstGeom prst="rect">
             <a:avLst/>
@@ -2969,7 +2969,7 @@
           <a:p>
             <a:fld id="{0E59FD0C-5451-4CA0-86AF-E70AE3279989}" type="datetimeFigureOut">
               <a:rPr lang="en-US" dirty="0"/>
-              <a:t>4/9/2017</a:t>
+              <a:t>4/10/2017</a:t>
             </a:fld>
             <a:endParaRPr lang="en-US" dirty="0"/>
           </a:p>
@@ -2987,8 +2987,8 @@
         </p:nvSpPr>
         <p:spPr>
           <a:xfrm rot="16200000">
-            <a:off x="9959341" y="4046537"/>
-            <a:ext cx="3581400" cy="365125"/>
+            <a:off x="7021831" y="4092178"/>
+            <a:ext cx="3581400" cy="273844"/>
           </a:xfrm>
           <a:prstGeom prst="rect">
             <a:avLst/>
@@ -3025,8 +3025,8 @@
         </p:nvSpPr>
         <p:spPr>
           <a:xfrm>
-            <a:off x="11292840" y="6172200"/>
-            <a:ext cx="914400" cy="593725"/>
+            <a:off x="8469630" y="6172201"/>
+            <a:ext cx="685800" cy="593725"/>
           </a:xfrm>
           <a:prstGeom prst="rect">
             <a:avLst/>
@@ -3469,8 +3469,8 @@
         </p:nvSpPr>
         <p:spPr>
           <a:xfrm>
-            <a:off x="1261872" y="2583808"/>
-            <a:ext cx="9418320" cy="2216791"/>
+            <a:off x="946404" y="2583809"/>
+            <a:ext cx="7063740" cy="2216791"/>
           </a:xfrm>
         </p:spPr>
         <p:txBody>
@@ -3514,9 +3514,9 @@
           <p:nvPr/>
         </p:nvSpPr>
         <p:spPr>
-          <a:xfrm>
-            <a:off x="8786069" y="50334"/>
-            <a:ext cx="3355597" cy="707886"/>
+          <a:xfrm rot="16200000">
+            <a:off x="6643337" y="834106"/>
+            <a:ext cx="4440398" cy="707886"/>
           </a:xfrm>
           <a:prstGeom prst="rect">
             <a:avLst/>
@@ -3549,8 +3549,8 @@
         </p:nvSpPr>
         <p:spPr>
           <a:xfrm>
-            <a:off x="8786069" y="650449"/>
-            <a:ext cx="3185972" cy="1477328"/>
+            <a:off x="5960902" y="115564"/>
+            <a:ext cx="3542326" cy="1477328"/>
           </a:xfrm>
           <a:prstGeom prst="rect">
             <a:avLst/>
@@ -3624,11 +3624,11 @@
   <p:clrMapOvr>
     <a:masterClrMapping/>
   </p:clrMapOvr>
-  <mc:AlternateContent xmlns:mc="http://schemas.openxmlformats.org/markup-compatibility/2006" xmlns:p14="http://schemas.microsoft.com/office/powerpoint/2010/main">
-    <mc:Choice Requires="p14">
-      <p:transition p14:dur="0"/>
+  <mc:AlternateContent xmlns:mc="http://schemas.openxmlformats.org/markup-compatibility/2006">
+    <mc:Choice xmlns:p14="http://schemas.microsoft.com/office/powerpoint/2010/main" Requires="p14">
+      <p:transition p14:dur="10"/>
     </mc:Choice>
-    <mc:Fallback xmlns="">
+    <mc:Fallback>
       <p:transition/>
     </mc:Fallback>
   </mc:AlternateContent>
@@ -3667,7 +3667,7 @@
         </p:nvSpPr>
         <p:spPr>
           <a:xfrm rot="16200000">
-            <a:off x="10123989" y="1376138"/>
+            <a:off x="7173543" y="1376139"/>
             <a:ext cx="3355597" cy="707886"/>
           </a:xfrm>
           <a:prstGeom prst="rect">
@@ -3703,8 +3703,8 @@
         </p:nvSpPr>
         <p:spPr>
           <a:xfrm>
-            <a:off x="357501" y="528130"/>
-            <a:ext cx="9692640" cy="716348"/>
+            <a:off x="268126" y="528130"/>
+            <a:ext cx="7269480" cy="716348"/>
           </a:xfrm>
           <a:prstGeom prst="rect">
             <a:avLst/>
@@ -3752,7 +3752,7 @@
           <a:blip r:embed="rId2">
             <a:extLst>
               <a:ext uri="{96DAC541-7B7A-43D3-8B79-37D633B846F1}">
-                <asvg:svgBlip xmlns:asvg="http://schemas.microsoft.com/office/drawing/2016/SVG/main" xmlns="" r:embed="rId15"/>
+                <asvg:svgBlip xmlns="" xmlns:asvg="http://schemas.microsoft.com/office/drawing/2016/SVG/main" r:embed="rId15"/>
               </a:ext>
             </a:extLst>
           </a:blip>
@@ -3762,8 +3762,8 @@
         </p:blipFill>
         <p:spPr>
           <a:xfrm>
-            <a:off x="5580077" y="1880772"/>
-            <a:ext cx="1588819" cy="1588819"/>
+            <a:off x="4438747" y="2370764"/>
+            <a:ext cx="1027732" cy="1056020"/>
           </a:xfrm>
           <a:prstGeom prst="rect">
             <a:avLst/>
@@ -3778,8 +3778,8 @@
         </p:nvSpPr>
         <p:spPr>
           <a:xfrm>
-            <a:off x="2127903" y="2413571"/>
-            <a:ext cx="3609402" cy="523220"/>
+            <a:off x="1412690" y="2648421"/>
+            <a:ext cx="2955201" cy="461665"/>
           </a:xfrm>
           <a:prstGeom prst="rect">
             <a:avLst/>
@@ -3793,7 +3793,7 @@
           <a:lstStyle/>
           <a:p>
             <a:r>
-              <a:rPr lang="de-DE" sz="2800" dirty="0" smtClean="0"/>
+              <a:rPr lang="de-DE" sz="2400" dirty="0" smtClean="0"/>
               <a:t>Qualitätssicherung</a:t>
             </a:r>
           </a:p>
@@ -3807,8 +3807,8 @@
         </p:nvSpPr>
         <p:spPr>
           <a:xfrm>
-            <a:off x="7168896" y="2413571"/>
-            <a:ext cx="3566160" cy="523220"/>
+            <a:off x="5376672" y="2648420"/>
+            <a:ext cx="2674620" cy="461665"/>
           </a:xfrm>
           <a:prstGeom prst="rect">
             <a:avLst/>
@@ -3822,10 +3822,10 @@
           <a:lstStyle/>
           <a:p>
             <a:r>
-              <a:rPr lang="de-DE" sz="2800" dirty="0" smtClean="0"/>
+              <a:rPr lang="de-DE" sz="2400" dirty="0" smtClean="0"/>
               <a:t>Standardisierung</a:t>
             </a:r>
-            <a:endParaRPr lang="de-DE" sz="2800" dirty="0"/>
+            <a:endParaRPr lang="de-DE" sz="2400" dirty="0"/>
           </a:p>
         </p:txBody>
       </p:sp>
@@ -3837,8 +3837,8 @@
         </p:nvSpPr>
         <p:spPr>
           <a:xfrm>
-            <a:off x="2256090" y="4831180"/>
-            <a:ext cx="4242816" cy="954107"/>
+            <a:off x="1692068" y="4612104"/>
+            <a:ext cx="3182112" cy="830997"/>
           </a:xfrm>
           <a:prstGeom prst="rect">
             <a:avLst/>
@@ -3852,16 +3852,16 @@
           <a:lstStyle/>
           <a:p>
             <a:r>
-              <a:rPr lang="de-DE" sz="2800" dirty="0" smtClean="0"/>
+              <a:rPr lang="de-DE" sz="2400" dirty="0" smtClean="0"/>
               <a:t>Festlegen der </a:t>
             </a:r>
           </a:p>
           <a:p>
             <a:r>
-              <a:rPr lang="de-DE" sz="2800" dirty="0" smtClean="0"/>
+              <a:rPr lang="de-DE" sz="2400" dirty="0" smtClean="0"/>
               <a:t>Vorgehensweisen</a:t>
             </a:r>
-            <a:endParaRPr lang="de-DE" sz="2800" dirty="0"/>
+            <a:endParaRPr lang="de-DE" sz="2400" dirty="0"/>
           </a:p>
         </p:txBody>
       </p:sp>
@@ -3873,8 +3873,8 @@
         </p:nvSpPr>
         <p:spPr>
           <a:xfrm>
-            <a:off x="7168896" y="4831180"/>
-            <a:ext cx="3803904" cy="1231106"/>
+            <a:off x="5466479" y="4428374"/>
+            <a:ext cx="2852928" cy="1477328"/>
           </a:xfrm>
           <a:prstGeom prst="rect">
             <a:avLst/>
@@ -3888,9 +3888,18 @@
           <a:lstStyle/>
           <a:p>
             <a:r>
-              <a:rPr lang="de-DE" sz="2800" dirty="0" smtClean="0"/>
-              <a:t>Festlegen der Verantwortlichkeiten</a:t>
-            </a:r>
+              <a:rPr lang="de-DE" sz="2400" dirty="0" smtClean="0"/>
+              <a:t>Festlegen der </a:t>
+            </a:r>
+            <a:r>
+              <a:rPr lang="de-DE" sz="2400" dirty="0" smtClean="0"/>
+              <a:t>Verantwortlich-</a:t>
+            </a:r>
+            <a:r>
+              <a:rPr lang="de-DE" sz="2400" dirty="0" err="1" smtClean="0"/>
+              <a:t>keiten</a:t>
+            </a:r>
+            <a:endParaRPr lang="de-DE" sz="2400" dirty="0" smtClean="0"/>
           </a:p>
           <a:p>
             <a:endParaRPr lang="de-DE" dirty="0"/>
@@ -3920,8 +3929,8 @@
         </p:blipFill>
         <p:spPr>
           <a:xfrm>
-            <a:off x="608178" y="1924923"/>
-            <a:ext cx="1647912" cy="1647912"/>
+            <a:off x="469296" y="2310328"/>
+            <a:ext cx="1021602" cy="1159264"/>
           </a:xfrm>
           <a:prstGeom prst="rect">
             <a:avLst/>
@@ -3951,8 +3960,8 @@
         </p:blipFill>
         <p:spPr>
           <a:xfrm>
-            <a:off x="357501" y="4358938"/>
-            <a:ext cx="1898589" cy="1898589"/>
+            <a:off x="469296" y="4393029"/>
+            <a:ext cx="1144234" cy="1269149"/>
           </a:xfrm>
           <a:prstGeom prst="rect">
             <a:avLst/>
@@ -3982,8 +3991,8 @@
         </p:blipFill>
         <p:spPr>
           <a:xfrm>
-            <a:off x="5355906" y="4530666"/>
-            <a:ext cx="2286000" cy="1531620"/>
+            <a:off x="4188481" y="4462331"/>
+            <a:ext cx="1714500" cy="1130544"/>
           </a:xfrm>
           <a:prstGeom prst="rect">
             <a:avLst/>
@@ -4000,11 +4009,11 @@
   <p:clrMapOvr>
     <a:masterClrMapping/>
   </p:clrMapOvr>
-  <mc:AlternateContent xmlns:mc="http://schemas.openxmlformats.org/markup-compatibility/2006">
-    <mc:Choice xmlns:p14="http://schemas.microsoft.com/office/powerpoint/2010/main" Requires="p14">
+  <mc:AlternateContent xmlns:mc="http://schemas.openxmlformats.org/markup-compatibility/2006" xmlns:p14="http://schemas.microsoft.com/office/powerpoint/2010/main">
+    <mc:Choice Requires="p14">
       <p:transition p14:dur="0"/>
     </mc:Choice>
-    <mc:Fallback>
+    <mc:Fallback xmlns="">
       <p:transition/>
     </mc:Fallback>
   </mc:AlternateContent>
@@ -4424,7 +4433,7 @@
         </p:nvSpPr>
         <p:spPr>
           <a:xfrm rot="16200000">
-            <a:off x="10123989" y="1376138"/>
+            <a:off x="7173543" y="1376139"/>
             <a:ext cx="3355597" cy="707886"/>
           </a:xfrm>
           <a:prstGeom prst="rect">
@@ -4460,8 +4469,8 @@
         </p:nvSpPr>
         <p:spPr>
           <a:xfrm>
-            <a:off x="450022" y="476855"/>
-            <a:ext cx="9692640" cy="716348"/>
+            <a:off x="337517" y="476855"/>
+            <a:ext cx="7269480" cy="716348"/>
           </a:xfrm>
           <a:prstGeom prst="rect">
             <a:avLst/>
@@ -4513,8 +4522,8 @@
         </p:nvSpPr>
         <p:spPr>
           <a:xfrm>
-            <a:off x="706395" y="4341264"/>
-            <a:ext cx="2737560" cy="954107"/>
+            <a:off x="635436" y="4332717"/>
+            <a:ext cx="2053170" cy="830997"/>
           </a:xfrm>
           <a:prstGeom prst="rect">
             <a:avLst/>
@@ -4529,7 +4538,7 @@
           <a:p>
             <a:pPr algn="ctr"/>
             <a:r>
-              <a:rPr lang="de-DE" sz="2800" dirty="0" smtClean="0"/>
+              <a:rPr lang="de-DE" sz="2400" dirty="0" smtClean="0"/>
               <a:t>Erhöhen der Lesbarkeit</a:t>
             </a:r>
           </a:p>
@@ -4557,8 +4566,8 @@
         </p:blipFill>
         <p:spPr>
           <a:xfrm>
-            <a:off x="791854" y="1193203"/>
-            <a:ext cx="2566643" cy="2566643"/>
+            <a:off x="741076" y="1580247"/>
+            <a:ext cx="1841890" cy="2085517"/>
           </a:xfrm>
           <a:prstGeom prst="rect">
             <a:avLst/>
@@ -4587,8 +4596,8 @@
         </p:blipFill>
         <p:spPr>
           <a:xfrm>
-            <a:off x="4779165" y="1580248"/>
-            <a:ext cx="1792552" cy="1792552"/>
+            <a:off x="3584374" y="2032906"/>
+            <a:ext cx="1344414" cy="1339893"/>
           </a:xfrm>
           <a:prstGeom prst="rect">
             <a:avLst/>
@@ -4617,8 +4626,8 @@
         </p:blipFill>
         <p:spPr>
           <a:xfrm>
-            <a:off x="8369112" y="1589749"/>
-            <a:ext cx="1773550" cy="1773550"/>
+            <a:off x="6276834" y="2098221"/>
+            <a:ext cx="1330163" cy="1309660"/>
           </a:xfrm>
           <a:prstGeom prst="rect">
             <a:avLst/>
@@ -4633,8 +4642,8 @@
         </p:nvSpPr>
         <p:spPr>
           <a:xfrm>
-            <a:off x="4150017" y="4332718"/>
-            <a:ext cx="3050848" cy="1231106"/>
+            <a:off x="3112513" y="4332718"/>
+            <a:ext cx="2288136" cy="1477328"/>
           </a:xfrm>
           <a:prstGeom prst="rect">
             <a:avLst/>
@@ -4649,14 +4658,14 @@
           <a:p>
             <a:pPr algn="ctr"/>
             <a:r>
-              <a:rPr lang="de-DE" sz="2800" dirty="0"/>
+              <a:rPr lang="de-DE" sz="2400" dirty="0"/>
               <a:t>Vereinfachen </a:t>
             </a:r>
             <a:r>
-              <a:rPr lang="de-DE" sz="2800" dirty="0" smtClean="0"/>
+              <a:rPr lang="de-DE" sz="2400" dirty="0" smtClean="0"/>
               <a:t>der Einarbeitung</a:t>
             </a:r>
-            <a:endParaRPr lang="de-DE" sz="2800" dirty="0"/>
+            <a:endParaRPr lang="de-DE" sz="2400" dirty="0"/>
           </a:p>
           <a:p>
             <a:endParaRPr lang="de-DE" dirty="0"/>
@@ -4671,8 +4680,8 @@
         </p:nvSpPr>
         <p:spPr>
           <a:xfrm>
-            <a:off x="7901379" y="4341263"/>
-            <a:ext cx="2709016" cy="954107"/>
+            <a:off x="5757475" y="4332718"/>
+            <a:ext cx="2368880" cy="830997"/>
           </a:xfrm>
           <a:prstGeom prst="rect">
             <a:avLst/>
@@ -4687,10 +4696,10 @@
           <a:p>
             <a:pPr algn="ctr"/>
             <a:r>
-              <a:rPr lang="de-DE" sz="2800" dirty="0" smtClean="0"/>
+              <a:rPr lang="de-DE" sz="2400" dirty="0" smtClean="0"/>
               <a:t>Sicherstellung der Wartung</a:t>
             </a:r>
-            <a:endParaRPr lang="de-DE" sz="2800" dirty="0"/>
+            <a:endParaRPr lang="de-DE" sz="2400" dirty="0"/>
           </a:p>
         </p:txBody>
       </p:sp>
@@ -4704,11 +4713,11 @@
   <p:clrMapOvr>
     <a:masterClrMapping/>
   </p:clrMapOvr>
-  <mc:AlternateContent xmlns:mc="http://schemas.openxmlformats.org/markup-compatibility/2006">
-    <mc:Choice xmlns:p14="http://schemas.microsoft.com/office/powerpoint/2010/main" Requires="p14">
+  <mc:AlternateContent xmlns:mc="http://schemas.openxmlformats.org/markup-compatibility/2006" xmlns:p14="http://schemas.microsoft.com/office/powerpoint/2010/main">
+    <mc:Choice Requires="p14">
       <p:transition p14:dur="0"/>
     </mc:Choice>
-    <mc:Fallback>
+    <mc:Fallback xmlns="">
       <p:transition/>
     </mc:Fallback>
   </mc:AlternateContent>
@@ -4934,7 +4943,7 @@
         </p:nvSpPr>
         <p:spPr>
           <a:xfrm rot="16200000">
-            <a:off x="10123989" y="1376138"/>
+            <a:off x="7173543" y="1376139"/>
             <a:ext cx="3355597" cy="707886"/>
           </a:xfrm>
           <a:prstGeom prst="rect">
@@ -4970,8 +4979,8 @@
         </p:nvSpPr>
         <p:spPr>
           <a:xfrm>
-            <a:off x="356018" y="398234"/>
-            <a:ext cx="9692640" cy="716348"/>
+            <a:off x="267014" y="398234"/>
+            <a:ext cx="7269480" cy="716348"/>
           </a:xfrm>
           <a:prstGeom prst="rect">
             <a:avLst/>
@@ -5015,8 +5024,8 @@
         </p:nvSpPr>
         <p:spPr>
           <a:xfrm>
-            <a:off x="655121" y="1776955"/>
-            <a:ext cx="5349838" cy="3877985"/>
+            <a:off x="491340" y="1948406"/>
+            <a:ext cx="4012379" cy="4016484"/>
           </a:xfrm>
           <a:prstGeom prst="rect">
             <a:avLst/>
@@ -5030,7 +5039,7 @@
           <a:lstStyle/>
           <a:p>
             <a:r>
-              <a:rPr lang="de-DE" sz="2800" b="1" dirty="0" smtClean="0"/>
+              <a:rPr lang="de-DE" sz="2400" b="1" dirty="0" smtClean="0"/>
               <a:t>Intern</a:t>
             </a:r>
           </a:p>
@@ -5043,7 +5052,7 @@
               <a:buChar char="-"/>
             </a:pPr>
             <a:r>
-              <a:rPr lang="de-DE" sz="2500" dirty="0" smtClean="0"/>
+              <a:rPr lang="de-DE" sz="2300" dirty="0" smtClean="0"/>
               <a:t>Zum Gebrauch innerhalb des Entwicklerteams</a:t>
             </a:r>
           </a:p>
@@ -5053,7 +5062,7 @@
               <a:buChar char="-"/>
             </a:pPr>
             <a:r>
-              <a:rPr lang="de-DE" sz="2500" dirty="0" smtClean="0"/>
+              <a:rPr lang="de-DE" sz="2300" dirty="0" smtClean="0"/>
               <a:t>Code soll selbsterklärend sein</a:t>
             </a:r>
           </a:p>
@@ -5063,7 +5072,7 @@
               <a:buChar char="-"/>
             </a:pPr>
             <a:r>
-              <a:rPr lang="de-DE" sz="2500" dirty="0" smtClean="0"/>
+              <a:rPr lang="de-DE" sz="2300" dirty="0" smtClean="0"/>
               <a:t>Kommentare aufs Wesentliche beschränken</a:t>
             </a:r>
           </a:p>
@@ -5073,14 +5082,14 @@
               <a:buChar char="-"/>
             </a:pPr>
             <a:r>
-              <a:rPr lang="de-DE" sz="2500" dirty="0" smtClean="0"/>
+              <a:rPr lang="de-DE" sz="2300" dirty="0" smtClean="0"/>
               <a:t>Dokumentationsdateien durch </a:t>
             </a:r>
             <a:r>
-              <a:rPr lang="de-DE" sz="2500" dirty="0" err="1" smtClean="0"/>
+              <a:rPr lang="de-DE" sz="2300" dirty="0" err="1" smtClean="0"/>
               <a:t>JavaDoc</a:t>
             </a:r>
-            <a:endParaRPr lang="de-DE" sz="2500" dirty="0" smtClean="0"/>
+            <a:endParaRPr lang="de-DE" sz="2300" dirty="0" smtClean="0"/>
           </a:p>
           <a:p>
             <a:pPr marL="285750" indent="-285750">
@@ -5099,8 +5108,8 @@
         </p:nvSpPr>
         <p:spPr>
           <a:xfrm>
-            <a:off x="6235696" y="1776956"/>
-            <a:ext cx="5349838" cy="2446824"/>
+            <a:off x="4676772" y="1921055"/>
+            <a:ext cx="4012379" cy="2616101"/>
           </a:xfrm>
           <a:prstGeom prst="rect">
             <a:avLst/>
@@ -5114,7 +5123,7 @@
           <a:lstStyle/>
           <a:p>
             <a:r>
-              <a:rPr lang="de-DE" sz="2800" b="1" dirty="0" smtClean="0"/>
+              <a:rPr lang="de-DE" sz="2400" b="1" dirty="0" smtClean="0"/>
               <a:t>Extern</a:t>
             </a:r>
           </a:p>
@@ -5127,7 +5136,7 @@
               <a:buChar char="-"/>
             </a:pPr>
             <a:r>
-              <a:rPr lang="de-DE" sz="2500" dirty="0"/>
+              <a:rPr lang="de-DE" sz="2300" dirty="0"/>
               <a:t>Designbeschreibung</a:t>
             </a:r>
           </a:p>
@@ -5137,12 +5146,8 @@
               <a:buChar char="-"/>
             </a:pPr>
             <a:r>
-              <a:rPr lang="de-DE" sz="2500" dirty="0"/>
-              <a:t>Anleitung zur </a:t>
-            </a:r>
-            <a:r>
-              <a:rPr lang="de-DE" sz="2500" dirty="0"/>
-              <a:t>Handhabung</a:t>
+              <a:rPr lang="de-DE" sz="2300" dirty="0"/>
+              <a:t>Anleitung zur Handhabung</a:t>
             </a:r>
           </a:p>
           <a:p>
@@ -5151,14 +5156,14 @@
               <a:buChar char="-"/>
             </a:pPr>
             <a:r>
-              <a:rPr lang="de-DE" sz="2500" dirty="0"/>
+              <a:rPr lang="de-DE" sz="2300" dirty="0"/>
               <a:t>Eventuelle FAQ oder </a:t>
             </a:r>
             <a:r>
-              <a:rPr lang="de-DE" sz="2500" dirty="0" err="1"/>
+              <a:rPr lang="de-DE" sz="2300" dirty="0" err="1"/>
               <a:t>Videotutorial</a:t>
             </a:r>
-            <a:endParaRPr lang="de-DE" sz="2500" dirty="0"/>
+            <a:endParaRPr lang="de-DE" sz="2300" dirty="0"/>
           </a:p>
         </p:txBody>
       </p:sp>
@@ -5172,11 +5177,11 @@
   <p:clrMapOvr>
     <a:masterClrMapping/>
   </p:clrMapOvr>
-  <mc:AlternateContent xmlns:mc="http://schemas.openxmlformats.org/markup-compatibility/2006">
-    <mc:Choice xmlns:p14="http://schemas.microsoft.com/office/powerpoint/2010/main" Requires="p14">
+  <mc:AlternateContent xmlns:mc="http://schemas.openxmlformats.org/markup-compatibility/2006" xmlns:p14="http://schemas.microsoft.com/office/powerpoint/2010/main">
+    <mc:Choice Requires="p14">
       <p:transition p14:dur="0"/>
     </mc:Choice>
-    <mc:Fallback>
+    <mc:Fallback xmlns="">
       <p:transition/>
     </mc:Fallback>
   </mc:AlternateContent>
@@ -5665,7 +5670,7 @@
         </p:nvSpPr>
         <p:spPr>
           <a:xfrm rot="16200000">
-            <a:off x="10123989" y="1376138"/>
+            <a:off x="7173543" y="1376139"/>
             <a:ext cx="3355597" cy="707886"/>
           </a:xfrm>
           <a:prstGeom prst="rect">
@@ -5701,8 +5706,8 @@
         </p:nvSpPr>
         <p:spPr>
           <a:xfrm>
-            <a:off x="356018" y="398234"/>
-            <a:ext cx="9692640" cy="716348"/>
+            <a:off x="267014" y="398234"/>
+            <a:ext cx="7269480" cy="716348"/>
           </a:xfrm>
           <a:prstGeom prst="rect">
             <a:avLst/>
@@ -5767,8 +5772,8 @@
         </p:blipFill>
         <p:spPr bwMode="auto">
           <a:xfrm>
-            <a:off x="2042849" y="1843296"/>
-            <a:ext cx="2434590" cy="1621472"/>
+            <a:off x="781022" y="2482355"/>
+            <a:ext cx="2819428" cy="1851052"/>
           </a:xfrm>
           <a:prstGeom prst="rect">
             <a:avLst/>
@@ -5802,8 +5807,8 @@
         </p:blipFill>
         <p:spPr bwMode="auto">
           <a:xfrm>
-            <a:off x="6291744" y="1831040"/>
-            <a:ext cx="3731614" cy="1865807"/>
+            <a:off x="4490208" y="2596655"/>
+            <a:ext cx="3285406" cy="1851052"/>
           </a:xfrm>
           <a:prstGeom prst="rect">
             <a:avLst/>
@@ -5833,69 +5838,6 @@
           </a:extLst>
         </p:spPr>
       </p:pic>
-      <p:pic>
-        <p:nvPicPr>
-          <p:cNvPr id="8" name="Bild 5" descr="Jenkins logo with title.svg"/>
-          <p:cNvPicPr/>
-          <p:nvPr/>
-        </p:nvPicPr>
-        <p:blipFill>
-          <a:blip r:embed="rId4" cstate="print">
-            <a:extLst>
-              <a:ext uri="{28A0092B-C50C-407E-A947-70E740481C1C}">
-                <a14:useLocalDpi xmlns:a14="http://schemas.microsoft.com/office/drawing/2010/main" val="0"/>
-              </a:ext>
-            </a:extLst>
-          </a:blip>
-          <a:srcRect/>
-          <a:stretch>
-            <a:fillRect/>
-          </a:stretch>
-        </p:blipFill>
-        <p:spPr bwMode="auto">
-          <a:xfrm>
-            <a:off x="983108" y="4423721"/>
-            <a:ext cx="4058416" cy="1405071"/>
-          </a:xfrm>
-          <a:prstGeom prst="rect">
-            <a:avLst/>
-          </a:prstGeom>
-          <a:noFill/>
-          <a:ln>
-            <a:noFill/>
-          </a:ln>
-        </p:spPr>
-      </p:pic>
-      <p:pic>
-        <p:nvPicPr>
-          <p:cNvPr id="3" name="Grafik 2"/>
-          <p:cNvPicPr>
-            <a:picLocks noChangeAspect="1"/>
-          </p:cNvPicPr>
-          <p:nvPr/>
-        </p:nvPicPr>
-        <p:blipFill>
-          <a:blip r:embed="rId5">
-            <a:extLst>
-              <a:ext uri="{28A0092B-C50C-407E-A947-70E740481C1C}">
-                <a14:useLocalDpi xmlns:a14="http://schemas.microsoft.com/office/drawing/2010/main" val="0"/>
-              </a:ext>
-            </a:extLst>
-          </a:blip>
-          <a:stretch>
-            <a:fillRect/>
-          </a:stretch>
-        </p:blipFill>
-        <p:spPr>
-          <a:xfrm>
-            <a:off x="6476453" y="4584468"/>
-            <a:ext cx="3546905" cy="1083576"/>
-          </a:xfrm>
-          <a:prstGeom prst="rect">
-            <a:avLst/>
-          </a:prstGeom>
-        </p:spPr>
-      </p:pic>
     </p:spTree>
     <p:extLst>
       <p:ext uri="{BB962C8B-B14F-4D97-AF65-F5344CB8AC3E}">
@@ -5906,11 +5848,11 @@
   <p:clrMapOvr>
     <a:masterClrMapping/>
   </p:clrMapOvr>
-  <mc:AlternateContent xmlns:mc="http://schemas.openxmlformats.org/markup-compatibility/2006">
-    <mc:Choice xmlns:p14="http://schemas.microsoft.com/office/powerpoint/2010/main" Requires="p14">
+  <mc:AlternateContent xmlns:mc="http://schemas.openxmlformats.org/markup-compatibility/2006" xmlns:p14="http://schemas.microsoft.com/office/powerpoint/2010/main">
+    <mc:Choice Requires="p14">
       <p:transition p14:dur="0"/>
     </mc:Choice>
-    <mc:Fallback>
+    <mc:Fallback xmlns="">
       <p:transition/>
     </mc:Fallback>
   </mc:AlternateContent>
@@ -5949,7 +5891,7 @@
         </p:nvSpPr>
         <p:spPr>
           <a:xfrm rot="16200000">
-            <a:off x="10123989" y="1376138"/>
+            <a:off x="7173543" y="1376139"/>
             <a:ext cx="3355597" cy="707886"/>
           </a:xfrm>
           <a:prstGeom prst="rect">
@@ -5983,8 +5925,8 @@
         </p:nvSpPr>
         <p:spPr>
           <a:xfrm>
-            <a:off x="-152591" y="-112666"/>
-            <a:ext cx="12605046" cy="7768128"/>
+            <a:off x="-114445" y="-112666"/>
+            <a:ext cx="9453785" cy="7768128"/>
           </a:xfrm>
           <a:prstGeom prst="rect">
             <a:avLst/>
@@ -6029,8 +5971,8 @@
         </p:nvSpPr>
         <p:spPr>
           <a:xfrm>
-            <a:off x="3559065" y="2755735"/>
-            <a:ext cx="5532182" cy="1015663"/>
+            <a:off x="2142145" y="2751941"/>
+            <a:ext cx="5218192" cy="1015663"/>
           </a:xfrm>
           <a:prstGeom prst="rect">
             <a:avLst/>
@@ -6065,11 +6007,11 @@
   <p:clrMapOvr>
     <a:masterClrMapping/>
   </p:clrMapOvr>
-  <mc:AlternateContent xmlns:mc="http://schemas.openxmlformats.org/markup-compatibility/2006">
-    <mc:Choice xmlns:p14="http://schemas.microsoft.com/office/powerpoint/2010/main" Requires="p14">
+  <mc:AlternateContent xmlns:mc="http://schemas.openxmlformats.org/markup-compatibility/2006" xmlns:p14="http://schemas.microsoft.com/office/powerpoint/2010/main">
+    <mc:Choice Requires="p14">
       <p:transition p14:dur="0"/>
     </mc:Choice>
-    <mc:Fallback>
+    <mc:Fallback xmlns="">
       <p:transition/>
     </mc:Fallback>
   </mc:AlternateContent>
@@ -6330,7 +6272,7 @@
   <a:extraClrSchemeLst/>
   <a:extLst>
     <a:ext uri="{05A4C25C-085E-4340-85A3-A5531E510DB2}">
-      <thm15:themeFamily xmlns:thm15="http://schemas.microsoft.com/office/thememl/2012/main" xmlns="" name="View" id="{BA0EB5A6-F2D4-4F82-977B-64ADEE4A2A69}" vid="{3969A8A2-35DB-4E3B-8885-16FD20568674}"/>
+      <thm15:themeFamily xmlns="" xmlns:thm15="http://schemas.microsoft.com/office/thememl/2012/main" name="View" id="{BA0EB5A6-F2D4-4F82-977B-64ADEE4A2A69}" vid="{3969A8A2-35DB-4E3B-8885-16FD20568674}"/>
     </a:ext>
   </a:extLst>
 </a:theme>

</xml_diff>